<commit_message>
final version of aamas
</commit_message>
<xml_diff>
--- a/papers/Presentations/aamas/context.pptx
+++ b/papers/Presentations/aamas/context.pptx
@@ -6,6 +6,7 @@
   </p:sldMasterIdLst>
   <p:sldIdLst>
     <p:sldId id="256" r:id="rId2"/>
+    <p:sldId id="258" r:id="rId3"/>
   </p:sldIdLst>
   <p:sldSz cx="12192000" cy="6858000"/>
   <p:notesSz cx="6858000" cy="9144000"/>
@@ -270,7 +271,7 @@
           <a:p>
             <a:fld id="{B7D7F12E-2BD6-4F81-9B77-9D0C57CFB827}" type="datetimeFigureOut">
               <a:rPr lang="fr-FR" smtClean="0"/>
-              <a:t>01/07/2018</a:t>
+              <a:t>02/07/2018</a:t>
             </a:fld>
             <a:endParaRPr lang="fr-FR"/>
           </a:p>
@@ -468,7 +469,7 @@
           <a:p>
             <a:fld id="{B7D7F12E-2BD6-4F81-9B77-9D0C57CFB827}" type="datetimeFigureOut">
               <a:rPr lang="fr-FR" smtClean="0"/>
-              <a:t>01/07/2018</a:t>
+              <a:t>02/07/2018</a:t>
             </a:fld>
             <a:endParaRPr lang="fr-FR"/>
           </a:p>
@@ -676,7 +677,7 @@
           <a:p>
             <a:fld id="{B7D7F12E-2BD6-4F81-9B77-9D0C57CFB827}" type="datetimeFigureOut">
               <a:rPr lang="fr-FR" smtClean="0"/>
-              <a:t>01/07/2018</a:t>
+              <a:t>02/07/2018</a:t>
             </a:fld>
             <a:endParaRPr lang="fr-FR"/>
           </a:p>
@@ -874,7 +875,7 @@
           <a:p>
             <a:fld id="{B7D7F12E-2BD6-4F81-9B77-9D0C57CFB827}" type="datetimeFigureOut">
               <a:rPr lang="fr-FR" smtClean="0"/>
-              <a:t>01/07/2018</a:t>
+              <a:t>02/07/2018</a:t>
             </a:fld>
             <a:endParaRPr lang="fr-FR"/>
           </a:p>
@@ -1149,7 +1150,7 @@
           <a:p>
             <a:fld id="{B7D7F12E-2BD6-4F81-9B77-9D0C57CFB827}" type="datetimeFigureOut">
               <a:rPr lang="fr-FR" smtClean="0"/>
-              <a:t>01/07/2018</a:t>
+              <a:t>02/07/2018</a:t>
             </a:fld>
             <a:endParaRPr lang="fr-FR"/>
           </a:p>
@@ -1414,7 +1415,7 @@
           <a:p>
             <a:fld id="{B7D7F12E-2BD6-4F81-9B77-9D0C57CFB827}" type="datetimeFigureOut">
               <a:rPr lang="fr-FR" smtClean="0"/>
-              <a:t>01/07/2018</a:t>
+              <a:t>02/07/2018</a:t>
             </a:fld>
             <a:endParaRPr lang="fr-FR"/>
           </a:p>
@@ -1826,7 +1827,7 @@
           <a:p>
             <a:fld id="{B7D7F12E-2BD6-4F81-9B77-9D0C57CFB827}" type="datetimeFigureOut">
               <a:rPr lang="fr-FR" smtClean="0"/>
-              <a:t>01/07/2018</a:t>
+              <a:t>02/07/2018</a:t>
             </a:fld>
             <a:endParaRPr lang="fr-FR"/>
           </a:p>
@@ -1967,7 +1968,7 @@
           <a:p>
             <a:fld id="{B7D7F12E-2BD6-4F81-9B77-9D0C57CFB827}" type="datetimeFigureOut">
               <a:rPr lang="fr-FR" smtClean="0"/>
-              <a:t>01/07/2018</a:t>
+              <a:t>02/07/2018</a:t>
             </a:fld>
             <a:endParaRPr lang="fr-FR"/>
           </a:p>
@@ -2080,7 +2081,7 @@
           <a:p>
             <a:fld id="{B7D7F12E-2BD6-4F81-9B77-9D0C57CFB827}" type="datetimeFigureOut">
               <a:rPr lang="fr-FR" smtClean="0"/>
-              <a:t>01/07/2018</a:t>
+              <a:t>02/07/2018</a:t>
             </a:fld>
             <a:endParaRPr lang="fr-FR"/>
           </a:p>
@@ -2391,7 +2392,7 @@
           <a:p>
             <a:fld id="{B7D7F12E-2BD6-4F81-9B77-9D0C57CFB827}" type="datetimeFigureOut">
               <a:rPr lang="fr-FR" smtClean="0"/>
-              <a:t>01/07/2018</a:t>
+              <a:t>02/07/2018</a:t>
             </a:fld>
             <a:endParaRPr lang="fr-FR"/>
           </a:p>
@@ -2679,7 +2680,7 @@
           <a:p>
             <a:fld id="{B7D7F12E-2BD6-4F81-9B77-9D0C57CFB827}" type="datetimeFigureOut">
               <a:rPr lang="fr-FR" smtClean="0"/>
-              <a:t>01/07/2018</a:t>
+              <a:t>02/07/2018</a:t>
             </a:fld>
             <a:endParaRPr lang="fr-FR"/>
           </a:p>
@@ -2920,7 +2921,7 @@
           <a:p>
             <a:fld id="{B7D7F12E-2BD6-4F81-9B77-9D0C57CFB827}" type="datetimeFigureOut">
               <a:rPr lang="fr-FR" smtClean="0"/>
-              <a:t>01/07/2018</a:t>
+              <a:t>02/07/2018</a:t>
             </a:fld>
             <a:endParaRPr lang="fr-FR"/>
           </a:p>
@@ -3716,6 +3717,1386 @@
 </p:sld>
 </file>
 
+<file path=ppt/slides/slide2.xml><?xml version="1.0" encoding="utf-8"?>
+<p:sld xmlns:a="http://schemas.openxmlformats.org/drawingml/2006/main" xmlns:r="http://schemas.openxmlformats.org/officeDocument/2006/relationships" xmlns:p="http://schemas.openxmlformats.org/presentationml/2006/main">
+  <p:cSld>
+    <p:spTree>
+      <p:nvGrpSpPr>
+        <p:cNvPr id="1" name=""/>
+        <p:cNvGrpSpPr/>
+        <p:nvPr/>
+      </p:nvGrpSpPr>
+      <p:grpSpPr>
+        <a:xfrm>
+          <a:off x="0" y="0"/>
+          <a:ext cx="0" cy="0"/>
+          <a:chOff x="0" y="0"/>
+          <a:chExt cx="0" cy="0"/>
+        </a:xfrm>
+      </p:grpSpPr>
+      <p:grpSp>
+        <p:nvGrpSpPr>
+          <p:cNvPr id="1036" name="Groupe 1035">
+            <a:extLst>
+              <a:ext uri="{FF2B5EF4-FFF2-40B4-BE49-F238E27FC236}">
+                <a16:creationId xmlns:a16="http://schemas.microsoft.com/office/drawing/2014/main" id="{761A80F8-6AEC-4738-8393-00690C8A45F9}"/>
+              </a:ext>
+            </a:extLst>
+          </p:cNvPr>
+          <p:cNvGrpSpPr/>
+          <p:nvPr/>
+        </p:nvGrpSpPr>
+        <p:grpSpPr>
+          <a:xfrm>
+            <a:off x="385426" y="296536"/>
+            <a:ext cx="11375110" cy="6469544"/>
+            <a:chOff x="385426" y="296536"/>
+            <a:chExt cx="11375110" cy="6469544"/>
+          </a:xfrm>
+        </p:grpSpPr>
+        <p:pic>
+          <p:nvPicPr>
+            <p:cNvPr id="18" name="Image 17">
+              <a:extLst>
+                <a:ext uri="{FF2B5EF4-FFF2-40B4-BE49-F238E27FC236}">
+                  <a16:creationId xmlns:a16="http://schemas.microsoft.com/office/drawing/2014/main" id="{70BA6830-EA70-406B-91D2-BDD1A7539B18}"/>
+                </a:ext>
+              </a:extLst>
+            </p:cNvPr>
+            <p:cNvPicPr>
+              <a:picLocks noChangeAspect="1"/>
+            </p:cNvPicPr>
+            <p:nvPr/>
+          </p:nvPicPr>
+          <p:blipFill>
+            <a:blip r:embed="rId2">
+              <a:extLst>
+                <a:ext uri="{28A0092B-C50C-407E-A947-70E740481C1C}">
+                  <a14:useLocalDpi xmlns:a14="http://schemas.microsoft.com/office/drawing/2010/main" val="0"/>
+                </a:ext>
+              </a:extLst>
+            </a:blip>
+            <a:stretch>
+              <a:fillRect/>
+            </a:stretch>
+          </p:blipFill>
+          <p:spPr>
+            <a:xfrm>
+              <a:off x="385426" y="3875152"/>
+              <a:ext cx="1910611" cy="2890928"/>
+            </a:xfrm>
+            <a:prstGeom prst="rect">
+              <a:avLst/>
+            </a:prstGeom>
+          </p:spPr>
+        </p:pic>
+        <p:sp>
+          <p:nvSpPr>
+            <p:cNvPr id="20" name="Phylactère : pensées 19">
+              <a:extLst>
+                <a:ext uri="{FF2B5EF4-FFF2-40B4-BE49-F238E27FC236}">
+                  <a16:creationId xmlns:a16="http://schemas.microsoft.com/office/drawing/2014/main" id="{AAAF78F2-45E4-494A-8720-371D6A5B1C22}"/>
+                </a:ext>
+              </a:extLst>
+            </p:cNvPr>
+            <p:cNvSpPr/>
+            <p:nvPr/>
+          </p:nvSpPr>
+          <p:spPr>
+            <a:xfrm>
+              <a:off x="1963408" y="296536"/>
+              <a:ext cx="9747739" cy="3804139"/>
+            </a:xfrm>
+            <a:prstGeom prst="cloudCallout">
+              <a:avLst>
+                <a:gd name="adj1" fmla="val -46537"/>
+                <a:gd name="adj2" fmla="val 64054"/>
+              </a:avLst>
+            </a:prstGeom>
+            <a:noFill/>
+            <a:ln w="19050">
+              <a:solidFill>
+                <a:schemeClr val="tx2">
+                  <a:lumMod val="50000"/>
+                </a:schemeClr>
+              </a:solidFill>
+            </a:ln>
+          </p:spPr>
+          <p:style>
+            <a:lnRef idx="2">
+              <a:schemeClr val="accent1">
+                <a:shade val="50000"/>
+              </a:schemeClr>
+            </a:lnRef>
+            <a:fillRef idx="1">
+              <a:schemeClr val="accent1"/>
+            </a:fillRef>
+            <a:effectRef idx="0">
+              <a:schemeClr val="accent1"/>
+            </a:effectRef>
+            <a:fontRef idx="minor">
+              <a:schemeClr val="lt1"/>
+            </a:fontRef>
+          </p:style>
+          <p:txBody>
+            <a:bodyPr rtlCol="0" anchor="ctr"/>
+            <a:lstStyle/>
+            <a:p>
+              <a:pPr algn="ctr"/>
+              <a:endParaRPr lang="fr-FR"/>
+            </a:p>
+          </p:txBody>
+        </p:sp>
+        <p:sp>
+          <p:nvSpPr>
+            <p:cNvPr id="22" name="Rectangle 21">
+              <a:extLst>
+                <a:ext uri="{FF2B5EF4-FFF2-40B4-BE49-F238E27FC236}">
+                  <a16:creationId xmlns:a16="http://schemas.microsoft.com/office/drawing/2014/main" id="{E3EA0BF2-495E-4FB6-84E3-136300ACFEF6}"/>
+                </a:ext>
+              </a:extLst>
+            </p:cNvPr>
+            <p:cNvSpPr/>
+            <p:nvPr/>
+          </p:nvSpPr>
+          <p:spPr>
+            <a:xfrm>
+              <a:off x="6373405" y="1025246"/>
+              <a:ext cx="1991918" cy="1221936"/>
+            </a:xfrm>
+            <a:prstGeom prst="rect">
+              <a:avLst/>
+            </a:prstGeom>
+            <a:solidFill>
+              <a:schemeClr val="tx2">
+                <a:lumMod val="75000"/>
+              </a:schemeClr>
+            </a:solidFill>
+          </p:spPr>
+          <p:style>
+            <a:lnRef idx="2">
+              <a:schemeClr val="accent1">
+                <a:shade val="50000"/>
+              </a:schemeClr>
+            </a:lnRef>
+            <a:fillRef idx="1">
+              <a:schemeClr val="accent1"/>
+            </a:fillRef>
+            <a:effectRef idx="0">
+              <a:schemeClr val="accent1"/>
+            </a:effectRef>
+            <a:fontRef idx="minor">
+              <a:schemeClr val="lt1"/>
+            </a:fontRef>
+          </p:style>
+          <p:txBody>
+            <a:bodyPr rtlCol="0" anchor="ctr"/>
+            <a:lstStyle/>
+            <a:p>
+              <a:pPr algn="ctr"/>
+              <a:r>
+                <a:rPr lang="fr-FR" sz="2800" dirty="0"/>
+                <a:t>SELF </a:t>
+              </a:r>
+            </a:p>
+            <a:p>
+              <a:pPr algn="ctr"/>
+              <a:r>
+                <a:rPr lang="fr-FR" sz="2800" dirty="0"/>
+                <a:t>DECISIONAL MODEL</a:t>
+              </a:r>
+            </a:p>
+          </p:txBody>
+        </p:sp>
+        <p:sp>
+          <p:nvSpPr>
+            <p:cNvPr id="23" name="Flèche : droite 22">
+              <a:extLst>
+                <a:ext uri="{FF2B5EF4-FFF2-40B4-BE49-F238E27FC236}">
+                  <a16:creationId xmlns:a16="http://schemas.microsoft.com/office/drawing/2014/main" id="{31B68CFE-24CE-478D-B62F-FA47182C0C2B}"/>
+                </a:ext>
+              </a:extLst>
+            </p:cNvPr>
+            <p:cNvSpPr/>
+            <p:nvPr/>
+          </p:nvSpPr>
+          <p:spPr>
+            <a:xfrm>
+              <a:off x="5562599" y="1468735"/>
+              <a:ext cx="684073" cy="639757"/>
+            </a:xfrm>
+            <a:prstGeom prst="rightArrow">
+              <a:avLst/>
+            </a:prstGeom>
+            <a:solidFill>
+              <a:schemeClr val="bg2">
+                <a:lumMod val="90000"/>
+              </a:schemeClr>
+            </a:solidFill>
+            <a:ln>
+              <a:noFill/>
+            </a:ln>
+          </p:spPr>
+          <p:style>
+            <a:lnRef idx="2">
+              <a:schemeClr val="accent1">
+                <a:shade val="50000"/>
+              </a:schemeClr>
+            </a:lnRef>
+            <a:fillRef idx="1">
+              <a:schemeClr val="accent1"/>
+            </a:fillRef>
+            <a:effectRef idx="0">
+              <a:schemeClr val="accent1"/>
+            </a:effectRef>
+            <a:fontRef idx="minor">
+              <a:schemeClr val="lt1"/>
+            </a:fontRef>
+          </p:style>
+          <p:txBody>
+            <a:bodyPr rtlCol="0" anchor="ctr"/>
+            <a:lstStyle/>
+            <a:p>
+              <a:pPr algn="ctr"/>
+              <a:endParaRPr lang="fr-FR"/>
+            </a:p>
+          </p:txBody>
+        </p:sp>
+        <p:sp>
+          <p:nvSpPr>
+            <p:cNvPr id="26" name="Rectangle 25">
+              <a:extLst>
+                <a:ext uri="{FF2B5EF4-FFF2-40B4-BE49-F238E27FC236}">
+                  <a16:creationId xmlns:a16="http://schemas.microsoft.com/office/drawing/2014/main" id="{F34166BC-268E-46B3-B952-0E4CF5D51864}"/>
+                </a:ext>
+              </a:extLst>
+            </p:cNvPr>
+            <p:cNvSpPr/>
+            <p:nvPr/>
+          </p:nvSpPr>
+          <p:spPr>
+            <a:xfrm>
+              <a:off x="3926694" y="5879122"/>
+              <a:ext cx="4338611" cy="884323"/>
+            </a:xfrm>
+            <a:prstGeom prst="rect">
+              <a:avLst/>
+            </a:prstGeom>
+            <a:solidFill>
+              <a:schemeClr val="bg2"/>
+            </a:solidFill>
+            <a:ln>
+              <a:noFill/>
+            </a:ln>
+          </p:spPr>
+          <p:style>
+            <a:lnRef idx="2">
+              <a:schemeClr val="accent1">
+                <a:shade val="50000"/>
+              </a:schemeClr>
+            </a:lnRef>
+            <a:fillRef idx="1">
+              <a:schemeClr val="accent1"/>
+            </a:fillRef>
+            <a:effectRef idx="0">
+              <a:schemeClr val="accent1"/>
+            </a:effectRef>
+            <a:fontRef idx="minor">
+              <a:schemeClr val="lt1"/>
+            </a:fontRef>
+          </p:style>
+          <p:txBody>
+            <a:bodyPr rtlCol="0" anchor="ctr"/>
+            <a:lstStyle/>
+            <a:p>
+              <a:pPr algn="ctr"/>
+              <a:r>
+                <a:rPr lang="fr-FR" sz="2800" b="1" dirty="0">
+                  <a:solidFill>
+                    <a:schemeClr val="tx2"/>
+                  </a:solidFill>
+                </a:rPr>
+                <a:t>SIMULATION THEORY</a:t>
+              </a:r>
+              <a:endParaRPr lang="fr-FR" b="1" dirty="0">
+                <a:solidFill>
+                  <a:schemeClr val="tx2"/>
+                </a:solidFill>
+              </a:endParaRPr>
+            </a:p>
+          </p:txBody>
+        </p:sp>
+        <p:pic>
+          <p:nvPicPr>
+            <p:cNvPr id="19" name="Image 18">
+              <a:extLst>
+                <a:ext uri="{FF2B5EF4-FFF2-40B4-BE49-F238E27FC236}">
+                  <a16:creationId xmlns:a16="http://schemas.microsoft.com/office/drawing/2014/main" id="{17B0FC3F-B975-4700-8E09-8C76BF9B5810}"/>
+                </a:ext>
+              </a:extLst>
+            </p:cNvPr>
+            <p:cNvPicPr>
+              <a:picLocks noChangeAspect="1"/>
+            </p:cNvPicPr>
+            <p:nvPr/>
+          </p:nvPicPr>
+          <p:blipFill>
+            <a:blip r:embed="rId3">
+              <a:extLst>
+                <a:ext uri="{28A0092B-C50C-407E-A947-70E740481C1C}">
+                  <a14:useLocalDpi xmlns:a14="http://schemas.microsoft.com/office/drawing/2010/main" val="0"/>
+                </a:ext>
+              </a:extLst>
+            </a:blip>
+            <a:stretch>
+              <a:fillRect/>
+            </a:stretch>
+          </p:blipFill>
+          <p:spPr>
+            <a:xfrm>
+              <a:off x="4138772" y="2500373"/>
+              <a:ext cx="1000747" cy="1143487"/>
+            </a:xfrm>
+            <a:prstGeom prst="rect">
+              <a:avLst/>
+            </a:prstGeom>
+          </p:spPr>
+        </p:pic>
+        <p:grpSp>
+          <p:nvGrpSpPr>
+            <p:cNvPr id="57" name="Groupe 56">
+              <a:extLst>
+                <a:ext uri="{FF2B5EF4-FFF2-40B4-BE49-F238E27FC236}">
+                  <a16:creationId xmlns:a16="http://schemas.microsoft.com/office/drawing/2014/main" id="{D4936B4E-DBDE-42BD-8501-6D832916B6BE}"/>
+                </a:ext>
+              </a:extLst>
+            </p:cNvPr>
+            <p:cNvGrpSpPr/>
+            <p:nvPr/>
+          </p:nvGrpSpPr>
+          <p:grpSpPr>
+            <a:xfrm>
+              <a:off x="3397187" y="1028458"/>
+              <a:ext cx="1973429" cy="1430134"/>
+              <a:chOff x="3869749" y="1015609"/>
+              <a:chExt cx="1973429" cy="1430134"/>
+            </a:xfrm>
+          </p:grpSpPr>
+          <p:grpSp>
+            <p:nvGrpSpPr>
+              <p:cNvPr id="32" name="Groupe 31">
+                <a:extLst>
+                  <a:ext uri="{FF2B5EF4-FFF2-40B4-BE49-F238E27FC236}">
+                    <a16:creationId xmlns:a16="http://schemas.microsoft.com/office/drawing/2014/main" id="{8B657568-65A1-4353-BD71-514BE9EF30B9}"/>
+                  </a:ext>
+                </a:extLst>
+              </p:cNvPr>
+              <p:cNvGrpSpPr/>
+              <p:nvPr/>
+            </p:nvGrpSpPr>
+            <p:grpSpPr>
+              <a:xfrm>
+                <a:off x="3869749" y="1015609"/>
+                <a:ext cx="1821029" cy="1277734"/>
+                <a:chOff x="3926694" y="2383638"/>
+                <a:chExt cx="1821029" cy="1277734"/>
+              </a:xfrm>
+            </p:grpSpPr>
+            <p:sp>
+              <p:nvSpPr>
+                <p:cNvPr id="21" name="Rectangle 20">
+                  <a:extLst>
+                    <a:ext uri="{FF2B5EF4-FFF2-40B4-BE49-F238E27FC236}">
+                      <a16:creationId xmlns:a16="http://schemas.microsoft.com/office/drawing/2014/main" id="{8AD46352-679B-4FDD-A493-A0C05B7DB0DC}"/>
+                    </a:ext>
+                  </a:extLst>
+                </p:cNvPr>
+                <p:cNvSpPr/>
+                <p:nvPr/>
+              </p:nvSpPr>
+              <p:spPr>
+                <a:xfrm>
+                  <a:off x="3926694" y="2383638"/>
+                  <a:ext cx="1341263" cy="824772"/>
+                </a:xfrm>
+                <a:prstGeom prst="rect">
+                  <a:avLst/>
+                </a:prstGeom>
+                <a:solidFill>
+                  <a:schemeClr val="bg1">
+                    <a:lumMod val="65000"/>
+                  </a:schemeClr>
+                </a:solidFill>
+                <a:ln>
+                  <a:noFill/>
+                </a:ln>
+              </p:spPr>
+              <p:style>
+                <a:lnRef idx="2">
+                  <a:schemeClr val="accent1">
+                    <a:shade val="50000"/>
+                  </a:schemeClr>
+                </a:lnRef>
+                <a:fillRef idx="1">
+                  <a:schemeClr val="accent1"/>
+                </a:fillRef>
+                <a:effectRef idx="0">
+                  <a:schemeClr val="accent1"/>
+                </a:effectRef>
+                <a:fontRef idx="minor">
+                  <a:schemeClr val="lt1"/>
+                </a:fontRef>
+              </p:style>
+              <p:txBody>
+                <a:bodyPr rtlCol="0" anchor="ctr"/>
+                <a:lstStyle/>
+                <a:p>
+                  <a:pPr algn="ctr"/>
+                  <a:r>
+                    <a:rPr lang="fr-FR" sz="2800" dirty="0">
+                      <a:latin typeface="+mj-lt"/>
+                      <a:cs typeface="Arial" panose="020B0604020202020204" pitchFamily="34" charset="0"/>
+                    </a:rPr>
+                    <a:t> </a:t>
+                  </a:r>
+                </a:p>
+                <a:p>
+                  <a:pPr algn="ctr"/>
+                  <a:r>
+                    <a:rPr lang="fr-FR" sz="2800" dirty="0">
+                      <a:latin typeface="+mj-lt"/>
+                      <a:cs typeface="Arial" panose="020B0604020202020204" pitchFamily="34" charset="0"/>
+                    </a:rPr>
+                    <a:t>State</a:t>
+                  </a:r>
+                </a:p>
+              </p:txBody>
+            </p:sp>
+            <p:grpSp>
+              <p:nvGrpSpPr>
+                <p:cNvPr id="31" name="Groupe 30">
+                  <a:extLst>
+                    <a:ext uri="{FF2B5EF4-FFF2-40B4-BE49-F238E27FC236}">
+                      <a16:creationId xmlns:a16="http://schemas.microsoft.com/office/drawing/2014/main" id="{5DADB909-FFEB-4FBB-BF0F-E047DBB76C1B}"/>
+                    </a:ext>
+                  </a:extLst>
+                </p:cNvPr>
+                <p:cNvGrpSpPr/>
+                <p:nvPr/>
+              </p:nvGrpSpPr>
+              <p:grpSpPr>
+                <a:xfrm>
+                  <a:off x="4101660" y="2531800"/>
+                  <a:ext cx="1646063" cy="1129572"/>
+                  <a:chOff x="4101660" y="2531800"/>
+                  <a:chExt cx="1646063" cy="1129572"/>
+                </a:xfrm>
+              </p:grpSpPr>
+              <p:sp>
+                <p:nvSpPr>
+                  <p:cNvPr id="27" name="Rectangle 26">
+                    <a:extLst>
+                      <a:ext uri="{FF2B5EF4-FFF2-40B4-BE49-F238E27FC236}">
+                        <a16:creationId xmlns:a16="http://schemas.microsoft.com/office/drawing/2014/main" id="{E3FF67C3-C852-4A1D-91F0-98508F78319E}"/>
+                      </a:ext>
+                    </a:extLst>
+                  </p:cNvPr>
+                  <p:cNvSpPr/>
+                  <p:nvPr/>
+                </p:nvSpPr>
+                <p:spPr>
+                  <a:xfrm>
+                    <a:off x="4101660" y="2531800"/>
+                    <a:ext cx="1341263" cy="824772"/>
+                  </a:xfrm>
+                  <a:prstGeom prst="rect">
+                    <a:avLst/>
+                  </a:prstGeom>
+                  <a:solidFill>
+                    <a:schemeClr val="bg1">
+                      <a:lumMod val="65000"/>
+                    </a:schemeClr>
+                  </a:solidFill>
+                  <a:ln>
+                    <a:noFill/>
+                  </a:ln>
+                </p:spPr>
+                <p:style>
+                  <a:lnRef idx="2">
+                    <a:schemeClr val="accent1">
+                      <a:shade val="50000"/>
+                    </a:schemeClr>
+                  </a:lnRef>
+                  <a:fillRef idx="1">
+                    <a:schemeClr val="accent1"/>
+                  </a:fillRef>
+                  <a:effectRef idx="0">
+                    <a:schemeClr val="accent1"/>
+                  </a:effectRef>
+                  <a:fontRef idx="minor">
+                    <a:schemeClr val="lt1"/>
+                  </a:fontRef>
+                </p:style>
+                <p:txBody>
+                  <a:bodyPr rtlCol="0" anchor="ctr"/>
+                  <a:lstStyle/>
+                  <a:p>
+                    <a:pPr algn="ctr"/>
+                    <a:endParaRPr lang="fr-FR" sz="2800" dirty="0">
+                      <a:latin typeface="+mj-lt"/>
+                      <a:cs typeface="Arial" panose="020B0604020202020204" pitchFamily="34" charset="0"/>
+                    </a:endParaRPr>
+                  </a:p>
+                </p:txBody>
+              </p:sp>
+              <p:sp>
+                <p:nvSpPr>
+                  <p:cNvPr id="29" name="Rectangle 28">
+                    <a:extLst>
+                      <a:ext uri="{FF2B5EF4-FFF2-40B4-BE49-F238E27FC236}">
+                        <a16:creationId xmlns:a16="http://schemas.microsoft.com/office/drawing/2014/main" id="{8BEAC01D-3568-4D40-84C9-7D6E4B5539D0}"/>
+                      </a:ext>
+                    </a:extLst>
+                  </p:cNvPr>
+                  <p:cNvSpPr/>
+                  <p:nvPr/>
+                </p:nvSpPr>
+                <p:spPr>
+                  <a:xfrm>
+                    <a:off x="4254060" y="2684200"/>
+                    <a:ext cx="1341263" cy="824772"/>
+                  </a:xfrm>
+                  <a:prstGeom prst="rect">
+                    <a:avLst/>
+                  </a:prstGeom>
+                  <a:solidFill>
+                    <a:schemeClr val="bg1">
+                      <a:lumMod val="65000"/>
+                    </a:schemeClr>
+                  </a:solidFill>
+                  <a:ln>
+                    <a:noFill/>
+                  </a:ln>
+                </p:spPr>
+                <p:style>
+                  <a:lnRef idx="2">
+                    <a:schemeClr val="accent1">
+                      <a:shade val="50000"/>
+                    </a:schemeClr>
+                  </a:lnRef>
+                  <a:fillRef idx="1">
+                    <a:schemeClr val="accent1"/>
+                  </a:fillRef>
+                  <a:effectRef idx="0">
+                    <a:schemeClr val="accent1"/>
+                  </a:effectRef>
+                  <a:fontRef idx="minor">
+                    <a:schemeClr val="lt1"/>
+                  </a:fontRef>
+                </p:style>
+                <p:txBody>
+                  <a:bodyPr rtlCol="0" anchor="ctr"/>
+                  <a:lstStyle/>
+                  <a:p>
+                    <a:pPr algn="ctr"/>
+                    <a:endParaRPr lang="fr-FR" sz="2800" dirty="0">
+                      <a:latin typeface="+mj-lt"/>
+                      <a:cs typeface="Arial" panose="020B0604020202020204" pitchFamily="34" charset="0"/>
+                    </a:endParaRPr>
+                  </a:p>
+                </p:txBody>
+              </p:sp>
+              <p:sp>
+                <p:nvSpPr>
+                  <p:cNvPr id="30" name="Rectangle 29">
+                    <a:extLst>
+                      <a:ext uri="{FF2B5EF4-FFF2-40B4-BE49-F238E27FC236}">
+                        <a16:creationId xmlns:a16="http://schemas.microsoft.com/office/drawing/2014/main" id="{E4C784DA-8C23-42FB-A261-AA737BAB11DC}"/>
+                      </a:ext>
+                    </a:extLst>
+                  </p:cNvPr>
+                  <p:cNvSpPr/>
+                  <p:nvPr/>
+                </p:nvSpPr>
+                <p:spPr>
+                  <a:xfrm>
+                    <a:off x="4406460" y="2836600"/>
+                    <a:ext cx="1341263" cy="824772"/>
+                  </a:xfrm>
+                  <a:prstGeom prst="rect">
+                    <a:avLst/>
+                  </a:prstGeom>
+                  <a:solidFill>
+                    <a:schemeClr val="bg1">
+                      <a:lumMod val="65000"/>
+                    </a:schemeClr>
+                  </a:solidFill>
+                  <a:ln>
+                    <a:noFill/>
+                  </a:ln>
+                </p:spPr>
+                <p:style>
+                  <a:lnRef idx="2">
+                    <a:schemeClr val="accent1">
+                      <a:shade val="50000"/>
+                    </a:schemeClr>
+                  </a:lnRef>
+                  <a:fillRef idx="1">
+                    <a:schemeClr val="accent1"/>
+                  </a:fillRef>
+                  <a:effectRef idx="0">
+                    <a:schemeClr val="accent1"/>
+                  </a:effectRef>
+                  <a:fontRef idx="minor">
+                    <a:schemeClr val="lt1"/>
+                  </a:fontRef>
+                </p:style>
+                <p:txBody>
+                  <a:bodyPr rtlCol="0" anchor="ctr"/>
+                  <a:lstStyle/>
+                  <a:p>
+                    <a:pPr algn="ctr"/>
+                    <a:endParaRPr lang="fr-FR" sz="2800" dirty="0">
+                      <a:latin typeface="+mj-lt"/>
+                      <a:cs typeface="Arial" panose="020B0604020202020204" pitchFamily="34" charset="0"/>
+                    </a:endParaRPr>
+                  </a:p>
+                </p:txBody>
+              </p:sp>
+            </p:grpSp>
+          </p:grpSp>
+          <p:sp>
+            <p:nvSpPr>
+              <p:cNvPr id="28" name="Rectangle 27">
+                <a:extLst>
+                  <a:ext uri="{FF2B5EF4-FFF2-40B4-BE49-F238E27FC236}">
+                    <a16:creationId xmlns:a16="http://schemas.microsoft.com/office/drawing/2014/main" id="{4120368E-4558-4A26-80B4-3CACECB16FDA}"/>
+                  </a:ext>
+                </a:extLst>
+              </p:cNvPr>
+              <p:cNvSpPr/>
+              <p:nvPr/>
+            </p:nvSpPr>
+            <p:spPr>
+              <a:xfrm>
+                <a:off x="4501915" y="1620971"/>
+                <a:ext cx="1341263" cy="824772"/>
+              </a:xfrm>
+              <a:prstGeom prst="rect">
+                <a:avLst/>
+              </a:prstGeom>
+              <a:solidFill>
+                <a:schemeClr val="bg1">
+                  <a:lumMod val="65000"/>
+                </a:schemeClr>
+              </a:solidFill>
+              <a:ln>
+                <a:noFill/>
+              </a:ln>
+            </p:spPr>
+            <p:style>
+              <a:lnRef idx="2">
+                <a:schemeClr val="accent1">
+                  <a:shade val="50000"/>
+                </a:schemeClr>
+              </a:lnRef>
+              <a:fillRef idx="1">
+                <a:schemeClr val="accent1"/>
+              </a:fillRef>
+              <a:effectRef idx="0">
+                <a:schemeClr val="accent1"/>
+              </a:effectRef>
+              <a:fontRef idx="minor">
+                <a:schemeClr val="lt1"/>
+              </a:fontRef>
+            </p:style>
+            <p:txBody>
+              <a:bodyPr rtlCol="0" anchor="ctr"/>
+              <a:lstStyle/>
+              <a:p>
+                <a:pPr algn="ctr"/>
+                <a:r>
+                  <a:rPr lang="fr-FR" sz="2800" dirty="0">
+                    <a:latin typeface="+mj-lt"/>
+                    <a:cs typeface="Arial" panose="020B0604020202020204" pitchFamily="34" charset="0"/>
+                  </a:rPr>
+                  <a:t>Mental </a:t>
+                </a:r>
+              </a:p>
+              <a:p>
+                <a:pPr algn="ctr"/>
+                <a:r>
+                  <a:rPr lang="fr-FR" sz="2800" dirty="0">
+                    <a:latin typeface="+mj-lt"/>
+                    <a:cs typeface="Arial" panose="020B0604020202020204" pitchFamily="34" charset="0"/>
+                  </a:rPr>
+                  <a:t>State</a:t>
+                </a:r>
+              </a:p>
+            </p:txBody>
+          </p:sp>
+        </p:grpSp>
+        <p:sp>
+          <p:nvSpPr>
+            <p:cNvPr id="43" name="Flèche : droite 42">
+              <a:extLst>
+                <a:ext uri="{FF2B5EF4-FFF2-40B4-BE49-F238E27FC236}">
+                  <a16:creationId xmlns:a16="http://schemas.microsoft.com/office/drawing/2014/main" id="{D8D9915F-4E41-4AD6-BFF9-5DE44834C58B}"/>
+                </a:ext>
+              </a:extLst>
+            </p:cNvPr>
+            <p:cNvSpPr/>
+            <p:nvPr/>
+          </p:nvSpPr>
+          <p:spPr>
+            <a:xfrm>
+              <a:off x="8706027" y="1468734"/>
+              <a:ext cx="613249" cy="639758"/>
+            </a:xfrm>
+            <a:prstGeom prst="rightArrow">
+              <a:avLst/>
+            </a:prstGeom>
+            <a:solidFill>
+              <a:schemeClr val="bg2">
+                <a:lumMod val="90000"/>
+              </a:schemeClr>
+            </a:solidFill>
+            <a:ln>
+              <a:noFill/>
+            </a:ln>
+          </p:spPr>
+          <p:style>
+            <a:lnRef idx="2">
+              <a:schemeClr val="accent1">
+                <a:shade val="50000"/>
+              </a:schemeClr>
+            </a:lnRef>
+            <a:fillRef idx="1">
+              <a:schemeClr val="accent1"/>
+            </a:fillRef>
+            <a:effectRef idx="0">
+              <a:schemeClr val="accent1"/>
+            </a:effectRef>
+            <a:fontRef idx="minor">
+              <a:schemeClr val="lt1"/>
+            </a:fontRef>
+          </p:style>
+          <p:txBody>
+            <a:bodyPr rtlCol="0" anchor="ctr"/>
+            <a:lstStyle/>
+            <a:p>
+              <a:pPr algn="ctr"/>
+              <a:endParaRPr lang="fr-FR"/>
+            </a:p>
+          </p:txBody>
+        </p:sp>
+        <p:cxnSp>
+          <p:nvCxnSpPr>
+            <p:cNvPr id="44" name="Connecteur : en angle 43">
+              <a:extLst>
+                <a:ext uri="{FF2B5EF4-FFF2-40B4-BE49-F238E27FC236}">
+                  <a16:creationId xmlns:a16="http://schemas.microsoft.com/office/drawing/2014/main" id="{2EA71A20-83E9-4A5E-8E59-8605906FAEEE}"/>
+                </a:ext>
+              </a:extLst>
+            </p:cNvPr>
+            <p:cNvCxnSpPr>
+              <a:cxnSpLocks/>
+              <a:endCxn id="21" idx="1"/>
+            </p:cNvCxnSpPr>
+            <p:nvPr/>
+          </p:nvCxnSpPr>
+          <p:spPr>
+            <a:xfrm rot="10800000">
+              <a:off x="3397188" y="1440844"/>
+              <a:ext cx="741585" cy="1695754"/>
+            </a:xfrm>
+            <a:prstGeom prst="bentConnector3">
+              <a:avLst>
+                <a:gd name="adj1" fmla="val 147425"/>
+              </a:avLst>
+            </a:prstGeom>
+            <a:ln w="28575">
+              <a:tailEnd type="stealth"/>
+            </a:ln>
+          </p:spPr>
+          <p:style>
+            <a:lnRef idx="3">
+              <a:schemeClr val="accent3"/>
+            </a:lnRef>
+            <a:fillRef idx="0">
+              <a:schemeClr val="accent3"/>
+            </a:fillRef>
+            <a:effectRef idx="2">
+              <a:schemeClr val="accent3"/>
+            </a:effectRef>
+            <a:fontRef idx="minor">
+              <a:schemeClr val="tx1"/>
+            </a:fontRef>
+          </p:style>
+        </p:cxnSp>
+        <p:sp>
+          <p:nvSpPr>
+            <p:cNvPr id="46" name="ZoneTexte 45">
+              <a:extLst>
+                <a:ext uri="{FF2B5EF4-FFF2-40B4-BE49-F238E27FC236}">
+                  <a16:creationId xmlns:a16="http://schemas.microsoft.com/office/drawing/2014/main" id="{A655ECFE-F648-4C35-9BD0-1C2DD5E4143A}"/>
+                </a:ext>
+              </a:extLst>
+            </p:cNvPr>
+            <p:cNvSpPr txBox="1"/>
+            <p:nvPr/>
+          </p:nvSpPr>
+          <p:spPr>
+            <a:xfrm rot="16200000">
+              <a:off x="2316776" y="2102291"/>
+              <a:ext cx="1482969" cy="415498"/>
+            </a:xfrm>
+            <a:prstGeom prst="rect">
+              <a:avLst/>
+            </a:prstGeom>
+            <a:solidFill>
+              <a:schemeClr val="bg1"/>
+            </a:solidFill>
+            <a:ln w="28575">
+              <a:tailEnd type="stealth"/>
+            </a:ln>
+          </p:spPr>
+          <p:style>
+            <a:lnRef idx="3">
+              <a:schemeClr val="accent3"/>
+            </a:lnRef>
+            <a:fillRef idx="0">
+              <a:schemeClr val="accent3"/>
+            </a:fillRef>
+            <a:effectRef idx="2">
+              <a:schemeClr val="accent3"/>
+            </a:effectRef>
+            <a:fontRef idx="minor">
+              <a:schemeClr val="tx1"/>
+            </a:fontRef>
+          </p:style>
+          <p:txBody>
+            <a:bodyPr wrap="square" rtlCol="0">
+              <a:spAutoFit/>
+            </a:bodyPr>
+            <a:lstStyle/>
+            <a:p>
+              <a:r>
+                <a:rPr lang="en-US" sz="2100" dirty="0">
+                  <a:solidFill>
+                    <a:schemeClr val="tx2">
+                      <a:lumMod val="50000"/>
+                    </a:schemeClr>
+                  </a:solidFill>
+                </a:rPr>
+                <a:t>Hypotheses</a:t>
+              </a:r>
+            </a:p>
+          </p:txBody>
+        </p:sp>
+        <p:grpSp>
+          <p:nvGrpSpPr>
+            <p:cNvPr id="56" name="Groupe 55">
+              <a:extLst>
+                <a:ext uri="{FF2B5EF4-FFF2-40B4-BE49-F238E27FC236}">
+                  <a16:creationId xmlns:a16="http://schemas.microsoft.com/office/drawing/2014/main" id="{841A015B-EEA5-4E42-ABC0-44149F6E3787}"/>
+                </a:ext>
+              </a:extLst>
+            </p:cNvPr>
+            <p:cNvGrpSpPr/>
+            <p:nvPr/>
+          </p:nvGrpSpPr>
+          <p:grpSpPr>
+            <a:xfrm>
+              <a:off x="9471629" y="1035965"/>
+              <a:ext cx="1828513" cy="1364622"/>
+              <a:chOff x="9345195" y="1252837"/>
+              <a:chExt cx="1828513" cy="1364622"/>
+            </a:xfrm>
+          </p:grpSpPr>
+          <p:sp>
+            <p:nvSpPr>
+              <p:cNvPr id="25" name="Rectangle 24">
+                <a:extLst>
+                  <a:ext uri="{FF2B5EF4-FFF2-40B4-BE49-F238E27FC236}">
+                    <a16:creationId xmlns:a16="http://schemas.microsoft.com/office/drawing/2014/main" id="{7CF9DFD4-EE3C-4DBD-B6AE-52AAF15C9F1B}"/>
+                  </a:ext>
+                </a:extLst>
+              </p:cNvPr>
+              <p:cNvSpPr/>
+              <p:nvPr/>
+            </p:nvSpPr>
+            <p:spPr>
+              <a:xfrm>
+                <a:off x="9345195" y="1252837"/>
+                <a:ext cx="1371313" cy="907422"/>
+              </a:xfrm>
+              <a:prstGeom prst="rect">
+                <a:avLst/>
+              </a:prstGeom>
+              <a:solidFill>
+                <a:schemeClr val="tx2">
+                  <a:lumMod val="60000"/>
+                  <a:lumOff val="40000"/>
+                </a:schemeClr>
+              </a:solidFill>
+              <a:ln>
+                <a:noFill/>
+              </a:ln>
+            </p:spPr>
+            <p:style>
+              <a:lnRef idx="2">
+                <a:schemeClr val="accent1">
+                  <a:shade val="50000"/>
+                </a:schemeClr>
+              </a:lnRef>
+              <a:fillRef idx="1">
+                <a:schemeClr val="accent1"/>
+              </a:fillRef>
+              <a:effectRef idx="0">
+                <a:schemeClr val="accent1"/>
+              </a:effectRef>
+              <a:fontRef idx="minor">
+                <a:schemeClr val="lt1"/>
+              </a:fontRef>
+            </p:style>
+            <p:txBody>
+              <a:bodyPr rtlCol="0" anchor="ctr"/>
+              <a:lstStyle/>
+              <a:p>
+                <a:pPr algn="ctr"/>
+                <a:endParaRPr lang="fr-FR" sz="2800" dirty="0">
+                  <a:latin typeface="+mj-lt"/>
+                  <a:cs typeface="Arial" panose="020B0604020202020204" pitchFamily="34" charset="0"/>
+                </a:endParaRPr>
+              </a:p>
+            </p:txBody>
+          </p:sp>
+          <p:sp>
+            <p:nvSpPr>
+              <p:cNvPr id="51" name="Rectangle 50">
+                <a:extLst>
+                  <a:ext uri="{FF2B5EF4-FFF2-40B4-BE49-F238E27FC236}">
+                    <a16:creationId xmlns:a16="http://schemas.microsoft.com/office/drawing/2014/main" id="{68BC3AB4-4C5E-4FED-B4A4-ACD7009967A4}"/>
+                  </a:ext>
+                </a:extLst>
+              </p:cNvPr>
+              <p:cNvSpPr/>
+              <p:nvPr/>
+            </p:nvSpPr>
+            <p:spPr>
+              <a:xfrm>
+                <a:off x="9497595" y="1405237"/>
+                <a:ext cx="1371313" cy="907422"/>
+              </a:xfrm>
+              <a:prstGeom prst="rect">
+                <a:avLst/>
+              </a:prstGeom>
+              <a:solidFill>
+                <a:schemeClr val="tx2">
+                  <a:lumMod val="60000"/>
+                  <a:lumOff val="40000"/>
+                </a:schemeClr>
+              </a:solidFill>
+              <a:ln>
+                <a:noFill/>
+              </a:ln>
+            </p:spPr>
+            <p:style>
+              <a:lnRef idx="2">
+                <a:schemeClr val="accent1">
+                  <a:shade val="50000"/>
+                </a:schemeClr>
+              </a:lnRef>
+              <a:fillRef idx="1">
+                <a:schemeClr val="accent1"/>
+              </a:fillRef>
+              <a:effectRef idx="0">
+                <a:schemeClr val="accent1"/>
+              </a:effectRef>
+              <a:fontRef idx="minor">
+                <a:schemeClr val="lt1"/>
+              </a:fontRef>
+            </p:style>
+            <p:txBody>
+              <a:bodyPr rtlCol="0" anchor="ctr"/>
+              <a:lstStyle/>
+              <a:p>
+                <a:pPr algn="ctr"/>
+                <a:endParaRPr lang="fr-FR" sz="2800" dirty="0">
+                  <a:latin typeface="+mj-lt"/>
+                  <a:cs typeface="Arial" panose="020B0604020202020204" pitchFamily="34" charset="0"/>
+                </a:endParaRPr>
+              </a:p>
+            </p:txBody>
+          </p:sp>
+          <p:sp>
+            <p:nvSpPr>
+              <p:cNvPr id="52" name="Rectangle 51">
+                <a:extLst>
+                  <a:ext uri="{FF2B5EF4-FFF2-40B4-BE49-F238E27FC236}">
+                    <a16:creationId xmlns:a16="http://schemas.microsoft.com/office/drawing/2014/main" id="{6D524AC8-A2C8-429F-88F0-34ED44C2AE53}"/>
+                  </a:ext>
+                </a:extLst>
+              </p:cNvPr>
+              <p:cNvSpPr/>
+              <p:nvPr/>
+            </p:nvSpPr>
+            <p:spPr>
+              <a:xfrm>
+                <a:off x="9649995" y="1557637"/>
+                <a:ext cx="1371313" cy="907422"/>
+              </a:xfrm>
+              <a:prstGeom prst="rect">
+                <a:avLst/>
+              </a:prstGeom>
+              <a:solidFill>
+                <a:schemeClr val="tx2">
+                  <a:lumMod val="60000"/>
+                  <a:lumOff val="40000"/>
+                </a:schemeClr>
+              </a:solidFill>
+              <a:ln>
+                <a:noFill/>
+              </a:ln>
+            </p:spPr>
+            <p:style>
+              <a:lnRef idx="2">
+                <a:schemeClr val="accent1">
+                  <a:shade val="50000"/>
+                </a:schemeClr>
+              </a:lnRef>
+              <a:fillRef idx="1">
+                <a:schemeClr val="accent1"/>
+              </a:fillRef>
+              <a:effectRef idx="0">
+                <a:schemeClr val="accent1"/>
+              </a:effectRef>
+              <a:fontRef idx="minor">
+                <a:schemeClr val="lt1"/>
+              </a:fontRef>
+            </p:style>
+            <p:txBody>
+              <a:bodyPr rtlCol="0" anchor="ctr"/>
+              <a:lstStyle/>
+              <a:p>
+                <a:pPr algn="ctr"/>
+                <a:endParaRPr lang="fr-FR" sz="2800" dirty="0">
+                  <a:latin typeface="+mj-lt"/>
+                  <a:cs typeface="Arial" panose="020B0604020202020204" pitchFamily="34" charset="0"/>
+                </a:endParaRPr>
+              </a:p>
+            </p:txBody>
+          </p:sp>
+          <p:sp>
+            <p:nvSpPr>
+              <p:cNvPr id="53" name="Rectangle 52">
+                <a:extLst>
+                  <a:ext uri="{FF2B5EF4-FFF2-40B4-BE49-F238E27FC236}">
+                    <a16:creationId xmlns:a16="http://schemas.microsoft.com/office/drawing/2014/main" id="{6D2AAD42-D3F4-4A10-B20D-B8F2D5AB2183}"/>
+                  </a:ext>
+                </a:extLst>
+              </p:cNvPr>
+              <p:cNvSpPr/>
+              <p:nvPr/>
+            </p:nvSpPr>
+            <p:spPr>
+              <a:xfrm>
+                <a:off x="9802395" y="1710037"/>
+                <a:ext cx="1371313" cy="907422"/>
+              </a:xfrm>
+              <a:prstGeom prst="rect">
+                <a:avLst/>
+              </a:prstGeom>
+              <a:solidFill>
+                <a:schemeClr val="tx2">
+                  <a:lumMod val="60000"/>
+                  <a:lumOff val="40000"/>
+                </a:schemeClr>
+              </a:solidFill>
+              <a:ln>
+                <a:noFill/>
+              </a:ln>
+            </p:spPr>
+            <p:style>
+              <a:lnRef idx="2">
+                <a:schemeClr val="accent1">
+                  <a:shade val="50000"/>
+                </a:schemeClr>
+              </a:lnRef>
+              <a:fillRef idx="1">
+                <a:schemeClr val="accent1"/>
+              </a:fillRef>
+              <a:effectRef idx="0">
+                <a:schemeClr val="accent1"/>
+              </a:effectRef>
+              <a:fontRef idx="minor">
+                <a:schemeClr val="lt1"/>
+              </a:fontRef>
+            </p:style>
+            <p:txBody>
+              <a:bodyPr rtlCol="0" anchor="ctr"/>
+              <a:lstStyle/>
+              <a:p>
+                <a:pPr algn="ctr"/>
+                <a:r>
+                  <a:rPr lang="fr-FR" sz="2800" dirty="0" err="1">
+                    <a:latin typeface="+mj-lt"/>
+                    <a:cs typeface="Arial" panose="020B0604020202020204" pitchFamily="34" charset="0"/>
+                  </a:rPr>
+                  <a:t>Other</a:t>
+                </a:r>
+                <a:endParaRPr lang="fr-FR" sz="2800" dirty="0">
+                  <a:latin typeface="+mj-lt"/>
+                  <a:cs typeface="Arial" panose="020B0604020202020204" pitchFamily="34" charset="0"/>
+                </a:endParaRPr>
+              </a:p>
+              <a:p>
+                <a:pPr algn="ctr"/>
+                <a:r>
+                  <a:rPr lang="fr-FR" sz="2800" b="1" dirty="0" err="1">
+                    <a:latin typeface="+mj-lt"/>
+                    <a:cs typeface="Arial" panose="020B0604020202020204" pitchFamily="34" charset="0"/>
+                  </a:rPr>
+                  <a:t>Pow</a:t>
+                </a:r>
+                <a:endParaRPr lang="fr-FR" sz="2800" b="1" dirty="0">
+                  <a:latin typeface="+mj-lt"/>
+                  <a:cs typeface="Arial" panose="020B0604020202020204" pitchFamily="34" charset="0"/>
+                </a:endParaRPr>
+              </a:p>
+            </p:txBody>
+          </p:sp>
+        </p:grpSp>
+        <p:sp>
+          <p:nvSpPr>
+            <p:cNvPr id="55" name="Rectangle 54">
+              <a:extLst>
+                <a:ext uri="{FF2B5EF4-FFF2-40B4-BE49-F238E27FC236}">
+                  <a16:creationId xmlns:a16="http://schemas.microsoft.com/office/drawing/2014/main" id="{48F0ACE6-5DF3-41CC-B9D8-2F17F7088F0D}"/>
+                </a:ext>
+              </a:extLst>
+            </p:cNvPr>
+            <p:cNvSpPr/>
+            <p:nvPr/>
+          </p:nvSpPr>
+          <p:spPr>
+            <a:xfrm>
+              <a:off x="9134567" y="4364871"/>
+              <a:ext cx="2625969" cy="714476"/>
+            </a:xfrm>
+            <a:prstGeom prst="rect">
+              <a:avLst/>
+            </a:prstGeom>
+            <a:solidFill>
+              <a:schemeClr val="tx2">
+                <a:lumMod val="50000"/>
+              </a:schemeClr>
+            </a:solidFill>
+            <a:ln>
+              <a:noFill/>
+            </a:ln>
+          </p:spPr>
+          <p:style>
+            <a:lnRef idx="2">
+              <a:schemeClr val="accent1">
+                <a:shade val="50000"/>
+              </a:schemeClr>
+            </a:lnRef>
+            <a:fillRef idx="1">
+              <a:schemeClr val="accent1"/>
+            </a:fillRef>
+            <a:effectRef idx="0">
+              <a:schemeClr val="accent1"/>
+            </a:effectRef>
+            <a:fontRef idx="minor">
+              <a:schemeClr val="lt1"/>
+            </a:fontRef>
+          </p:style>
+          <p:txBody>
+            <a:bodyPr rtlCol="0" anchor="ctr"/>
+            <a:lstStyle/>
+            <a:p>
+              <a:pPr algn="ctr"/>
+              <a:r>
+                <a:rPr lang="fr-FR" sz="2800" dirty="0">
+                  <a:latin typeface="Arial" panose="020B0604020202020204" pitchFamily="34" charset="0"/>
+                  <a:cs typeface="Arial" panose="020B0604020202020204" pitchFamily="34" charset="0"/>
+                </a:rPr>
+                <a:t>ADAPTATION</a:t>
+              </a:r>
+            </a:p>
+          </p:txBody>
+        </p:sp>
+        <p:sp>
+          <p:nvSpPr>
+            <p:cNvPr id="60" name="Rectangle 59">
+              <a:extLst>
+                <a:ext uri="{FF2B5EF4-FFF2-40B4-BE49-F238E27FC236}">
+                  <a16:creationId xmlns:a16="http://schemas.microsoft.com/office/drawing/2014/main" id="{C0E3AE6D-C2FB-457F-881D-62AC02413061}"/>
+                </a:ext>
+              </a:extLst>
+            </p:cNvPr>
+            <p:cNvSpPr/>
+            <p:nvPr/>
+          </p:nvSpPr>
+          <p:spPr>
+            <a:xfrm>
+              <a:off x="4835008" y="2368378"/>
+              <a:ext cx="461615" cy="577072"/>
+            </a:xfrm>
+            <a:prstGeom prst="rect">
+              <a:avLst/>
+            </a:prstGeom>
+            <a:noFill/>
+            <a:ln>
+              <a:noFill/>
+            </a:ln>
+          </p:spPr>
+          <p:style>
+            <a:lnRef idx="2">
+              <a:schemeClr val="accent1">
+                <a:shade val="50000"/>
+              </a:schemeClr>
+            </a:lnRef>
+            <a:fillRef idx="1">
+              <a:schemeClr val="accent1"/>
+            </a:fillRef>
+            <a:effectRef idx="0">
+              <a:schemeClr val="accent1"/>
+            </a:effectRef>
+            <a:fontRef idx="minor">
+              <a:schemeClr val="lt1"/>
+            </a:fontRef>
+          </p:style>
+          <p:txBody>
+            <a:bodyPr rtlCol="0" anchor="ctr"/>
+            <a:lstStyle/>
+            <a:p>
+              <a:pPr algn="ctr"/>
+              <a:r>
+                <a:rPr lang="fr-FR" sz="4000" dirty="0">
+                  <a:solidFill>
+                    <a:schemeClr val="tx2">
+                      <a:lumMod val="50000"/>
+                    </a:schemeClr>
+                  </a:solidFill>
+                  <a:latin typeface="Arial" panose="020B0604020202020204" pitchFamily="34" charset="0"/>
+                  <a:cs typeface="Arial" panose="020B0604020202020204" pitchFamily="34" charset="0"/>
+                </a:rPr>
+                <a:t>?</a:t>
+              </a:r>
+            </a:p>
+          </p:txBody>
+        </p:sp>
+        <p:pic>
+          <p:nvPicPr>
+            <p:cNvPr id="62" name="Image 61">
+              <a:extLst>
+                <a:ext uri="{FF2B5EF4-FFF2-40B4-BE49-F238E27FC236}">
+                  <a16:creationId xmlns:a16="http://schemas.microsoft.com/office/drawing/2014/main" id="{583501CE-DDE2-464A-8B8A-C7B7E4B78C14}"/>
+                </a:ext>
+              </a:extLst>
+            </p:cNvPr>
+            <p:cNvPicPr>
+              <a:picLocks noChangeAspect="1"/>
+            </p:cNvPicPr>
+            <p:nvPr/>
+          </p:nvPicPr>
+          <p:blipFill>
+            <a:blip r:embed="rId4">
+              <a:extLst>
+                <a:ext uri="{28A0092B-C50C-407E-A947-70E740481C1C}">
+                  <a14:useLocalDpi xmlns:a14="http://schemas.microsoft.com/office/drawing/2010/main" val="0"/>
+                </a:ext>
+              </a:extLst>
+            </a:blip>
+            <a:stretch>
+              <a:fillRect/>
+            </a:stretch>
+          </p:blipFill>
+          <p:spPr>
+            <a:xfrm>
+              <a:off x="6789939" y="2247182"/>
+              <a:ext cx="1054544" cy="1034133"/>
+            </a:xfrm>
+            <a:prstGeom prst="rect">
+              <a:avLst/>
+            </a:prstGeom>
+          </p:spPr>
+        </p:pic>
+        <p:sp>
+          <p:nvSpPr>
+            <p:cNvPr id="1034" name="Flèche : bas 1033">
+              <a:extLst>
+                <a:ext uri="{FF2B5EF4-FFF2-40B4-BE49-F238E27FC236}">
+                  <a16:creationId xmlns:a16="http://schemas.microsoft.com/office/drawing/2014/main" id="{232B7B9D-4879-4549-B267-2321CD5232D6}"/>
+                </a:ext>
+              </a:extLst>
+            </p:cNvPr>
+            <p:cNvSpPr/>
+            <p:nvPr/>
+          </p:nvSpPr>
+          <p:spPr>
+            <a:xfrm>
+              <a:off x="9963201" y="2635427"/>
+              <a:ext cx="1054544" cy="1530816"/>
+            </a:xfrm>
+            <a:prstGeom prst="downArrow">
+              <a:avLst/>
+            </a:prstGeom>
+            <a:solidFill>
+              <a:schemeClr val="tx2">
+                <a:lumMod val="50000"/>
+              </a:schemeClr>
+            </a:solidFill>
+            <a:ln>
+              <a:solidFill>
+                <a:schemeClr val="tx2">
+                  <a:lumMod val="50000"/>
+                </a:schemeClr>
+              </a:solidFill>
+            </a:ln>
+          </p:spPr>
+          <p:style>
+            <a:lnRef idx="2">
+              <a:schemeClr val="accent1">
+                <a:shade val="50000"/>
+              </a:schemeClr>
+            </a:lnRef>
+            <a:fillRef idx="1">
+              <a:schemeClr val="accent1"/>
+            </a:fillRef>
+            <a:effectRef idx="0">
+              <a:schemeClr val="accent1"/>
+            </a:effectRef>
+            <a:fontRef idx="minor">
+              <a:schemeClr val="lt1"/>
+            </a:fontRef>
+          </p:style>
+          <p:txBody>
+            <a:bodyPr rtlCol="0" anchor="ctr"/>
+            <a:lstStyle/>
+            <a:p>
+              <a:pPr algn="ctr"/>
+              <a:endParaRPr lang="fr-FR"/>
+            </a:p>
+          </p:txBody>
+        </p:sp>
+      </p:grpSp>
+    </p:spTree>
+    <p:extLst>
+      <p:ext uri="{BB962C8B-B14F-4D97-AF65-F5344CB8AC3E}">
+        <p14:creationId xmlns:p14="http://schemas.microsoft.com/office/powerpoint/2010/main" val="3113671109"/>
+      </p:ext>
+    </p:extLst>
+  </p:cSld>
+  <p:clrMapOvr>
+    <a:masterClrMapping/>
+  </p:clrMapOvr>
+</p:sld>
+</file>
+
 <file path=ppt/theme/theme1.xml><?xml version="1.0" encoding="utf-8"?>
 <a:theme xmlns:a="http://schemas.openxmlformats.org/drawingml/2006/main" name="Thème Office">
   <a:themeElements>

</xml_diff>